<commit_message>
replaced data from corrupted files
</commit_message>
<xml_diff>
--- a/figures/fig2/fig2.pptx
+++ b/figures/fig2/fig2.pptx
@@ -259,7 +259,7 @@
       </p15:sldGuideLst>
     </p:ext>
     <p:ext uri="http://customooxmlschemas.google.com/">
-      <go:slidesCustomData xmlns="" xmlns:mc="http://schemas.openxmlformats.org/markup-compatibility/2006" xmlns:mv="urn:schemas-microsoft-com:mac:vml" xmlns:c="http://schemas.openxmlformats.org/drawingml/2006/chart" xmlns:dgm="http://schemas.openxmlformats.org/drawingml/2006/diagram" xmlns:o="urn:schemas-microsoft-com:office:office" xmlns:v="urn:schemas-microsoft-com:vml" xmlns:pvml="urn:schemas-microsoft-com:office:powerpoint" xmlns:com="http://schemas.openxmlformats.org/drawingml/2006/compatibility" xmlns:p14="http://schemas.microsoft.com/office/powerpoint/2010/main" xmlns:p15="http://schemas.microsoft.com/office/powerpoint/2012/main" xmlns:ahyp="http://schemas.microsoft.com/office/drawing/2018/hyperlinkcolor" xmlns:go="http://customooxmlschemas.google.com/" r:id="rId10" roundtripDataSignature="AMtx7mhiytGPk8UOxiAGs9KaAxakDbg4SQ=="/>
+      <go:slidesCustomData xmlns:go="http://customooxmlschemas.google.com/" xmlns:ahyp="http://schemas.microsoft.com/office/drawing/2018/hyperlinkcolor" xmlns:p15="http://schemas.microsoft.com/office/powerpoint/2012/main" xmlns:p14="http://schemas.microsoft.com/office/powerpoint/2010/main" xmlns:com="http://schemas.openxmlformats.org/drawingml/2006/compatibility" xmlns:pvml="urn:schemas-microsoft-com:office:powerpoint" xmlns:v="urn:schemas-microsoft-com:vml" xmlns:o="urn:schemas-microsoft-com:office:office" xmlns:dgm="http://schemas.openxmlformats.org/drawingml/2006/diagram" xmlns:c="http://schemas.openxmlformats.org/drawingml/2006/chart" xmlns:mv="urn:schemas-microsoft-com:mac:vml" xmlns:mc="http://schemas.openxmlformats.org/markup-compatibility/2006" xmlns="" r:id="rId10" roundtripDataSignature="AMtx7mhiytGPk8UOxiAGs9KaAxakDbg4SQ=="/>
     </p:ext>
   </p:extLst>
 </p:presentation>
@@ -12656,7 +12656,7 @@
         </p:blipFill>
         <p:spPr>
           <a:xfrm>
-            <a:off x="12597052" y="8930376"/>
+            <a:off x="12470052" y="8930376"/>
             <a:ext cx="1866184" cy="1517186"/>
           </a:xfrm>
           <a:prstGeom prst="rect">
@@ -12692,7 +12692,7 @@
         </p:blipFill>
         <p:spPr>
           <a:xfrm>
-            <a:off x="16050997" y="9484049"/>
+            <a:off x="15949397" y="9484049"/>
             <a:ext cx="2175107" cy="748755"/>
           </a:xfrm>
           <a:prstGeom prst="rect">
@@ -12728,43 +12728,8 @@
         </p:blipFill>
         <p:spPr>
           <a:xfrm>
-            <a:off x="19796870" y="8955776"/>
+            <a:off x="19873070" y="8955776"/>
             <a:ext cx="1748388" cy="1365928"/>
-          </a:xfrm>
-          <a:prstGeom prst="rect">
-            <a:avLst/>
-          </a:prstGeom>
-        </p:spPr>
-      </p:pic>
-      <p:pic>
-        <p:nvPicPr>
-          <p:cNvPr id="17" name="Graphic 16">
-            <a:extLst>
-              <a:ext uri="{FF2B5EF4-FFF2-40B4-BE49-F238E27FC236}">
-                <a16:creationId xmlns:a16="http://schemas.microsoft.com/office/drawing/2014/main" id="{E9CECCFE-9731-88CB-A5E2-EEEAC6EAFF68}"/>
-              </a:ext>
-            </a:extLst>
-          </p:cNvPr>
-          <p:cNvPicPr>
-            <a:picLocks noChangeAspect="1"/>
-          </p:cNvPicPr>
-          <p:nvPr/>
-        </p:nvPicPr>
-        <p:blipFill>
-          <a:blip r:embed="rId9">
-            <a:extLst>
-              <a:ext uri="{96DAC541-7B7A-43D3-8B79-37D633B846F1}">
-                <asvg:svgBlip xmlns:asvg="http://schemas.microsoft.com/office/drawing/2016/SVG/main" r:embed="rId10"/>
-              </a:ext>
-            </a:extLst>
-          </a:blip>
-          <a:srcRect t="17238"/>
-          <a:stretch/>
-        </p:blipFill>
-        <p:spPr>
-          <a:xfrm>
-            <a:off x="9758355" y="10620035"/>
-            <a:ext cx="13938224" cy="8243439"/>
           </a:xfrm>
           <a:prstGeom prst="rect">
             <a:avLst/>
@@ -12885,6 +12850,43 @@
           </a:p>
         </p:txBody>
       </p:sp>
+      <p:pic>
+        <p:nvPicPr>
+          <p:cNvPr id="12" name="Graphic 11">
+            <a:extLst>
+              <a:ext uri="{FF2B5EF4-FFF2-40B4-BE49-F238E27FC236}">
+                <a16:creationId xmlns:a16="http://schemas.microsoft.com/office/drawing/2014/main" id="{69FD2373-D570-820A-14E3-D52453066EF7}"/>
+              </a:ext>
+            </a:extLst>
+          </p:cNvPr>
+          <p:cNvPicPr>
+            <a:picLocks noChangeAspect="1"/>
+          </p:cNvPicPr>
+          <p:nvPr/>
+        </p:nvPicPr>
+        <p:blipFill>
+          <a:blip r:embed="rId9">
+            <a:extLst>
+              <a:ext uri="{96DAC541-7B7A-43D3-8B79-37D633B846F1}">
+                <asvg:svgBlip xmlns:asvg="http://schemas.microsoft.com/office/drawing/2016/SVG/main" r:embed="rId10"/>
+              </a:ext>
+            </a:extLst>
+          </a:blip>
+          <a:srcRect l="849" t="18798" r="7046" b="15457"/>
+          <a:stretch>
+            <a:fillRect/>
+          </a:stretch>
+        </p:blipFill>
+        <p:spPr>
+          <a:xfrm>
+            <a:off x="9071231" y="10447562"/>
+            <a:ext cx="13959532" cy="7735040"/>
+          </a:xfrm>
+          <a:prstGeom prst="rect">
+            <a:avLst/>
+          </a:prstGeom>
+        </p:spPr>
+      </p:pic>
     </p:spTree>
   </p:cSld>
   <p:clrMapOvr>
@@ -12912,10 +12914,10 @@
       </p:grpSpPr>
       <p:pic>
         <p:nvPicPr>
-          <p:cNvPr id="5" name="Graphic 4">
+          <p:cNvPr id="3" name="Picture 2" descr="A diagram of different types of animals&#10;&#10;AI-generated content may be incorrect.">
             <a:extLst>
               <a:ext uri="{FF2B5EF4-FFF2-40B4-BE49-F238E27FC236}">
-                <a16:creationId xmlns:a16="http://schemas.microsoft.com/office/drawing/2014/main" id="{BCA4B35A-2588-683D-7977-8BB7F5250278}"/>
+                <a16:creationId xmlns:a16="http://schemas.microsoft.com/office/drawing/2014/main" id="{9D8B1C30-DB83-1C89-9FB1-98CE8B298DE2}"/>
               </a:ext>
             </a:extLst>
           </p:cNvPr>
@@ -12925,20 +12927,16 @@
           <p:nvPr/>
         </p:nvPicPr>
         <p:blipFill>
-          <a:blip r:embed="rId2">
-            <a:extLst>
-              <a:ext uri="{96DAC541-7B7A-43D3-8B79-37D633B846F1}">
-                <asvg:svgBlip xmlns:asvg="http://schemas.microsoft.com/office/drawing/2016/SVG/main" r:embed="rId3"/>
-              </a:ext>
-            </a:extLst>
-          </a:blip>
-          <a:srcRect l="26914" t="26655" r="37606" b="47103"/>
-          <a:stretch/>
+          <a:blip r:embed="rId2"/>
+          <a:srcRect l="24819" t="26807" r="37101" b="44866"/>
+          <a:stretch>
+            <a:fillRect/>
+          </a:stretch>
         </p:blipFill>
         <p:spPr>
           <a:xfrm>
-            <a:off x="185131" y="4408714"/>
-            <a:ext cx="36205737" cy="24100971"/>
+            <a:off x="0" y="8432800"/>
+            <a:ext cx="36576000" cy="24485600"/>
           </a:xfrm>
           <a:prstGeom prst="rect">
             <a:avLst/>

</xml_diff>